<commit_message>
Update Facial Keypoints Detector.pptx
</commit_message>
<xml_diff>
--- a/Facial Keypoints Detector.pptx
+++ b/Facial Keypoints Detector.pptx
@@ -11408,7 +11408,7 @@
           <a:noFill/>
           <a:extLst>
             <a:ext uri="{909E8E84-426E-40dd-AFC4-6F175D3DCCD1}">
-              <a14:hiddenFill xmlns:a14="http://schemas.microsoft.com/office/drawing/2010/main" xmlns="">
+              <a14:hiddenFill xmlns="" xmlns:a14="http://schemas.microsoft.com/office/drawing/2010/main">
                 <a:solidFill>
                   <a:srgbClr val="FFFFFF"/>
                 </a:solidFill>
@@ -11468,7 +11468,7 @@
             </a:ln>
             <a:extLst>
               <a:ext uri="{91240B29-F687-4f45-9708-019B960494DF}">
-                <a14:hiddenLine xmlns:a14="http://schemas.microsoft.com/office/drawing/2010/main" xmlns="" w="9525">
+                <a14:hiddenLine xmlns="" xmlns:a14="http://schemas.microsoft.com/office/drawing/2010/main" w="9525">
                   <a:solidFill>
                     <a:srgbClr val="000000"/>
                   </a:solidFill>
@@ -11558,7 +11558,7 @@
             </a:ln>
             <a:extLst>
               <a:ext uri="{91240B29-F687-4f45-9708-019B960494DF}">
-                <a14:hiddenLine xmlns:a14="http://schemas.microsoft.com/office/drawing/2010/main" xmlns="" w="9525">
+                <a14:hiddenLine xmlns="" xmlns:a14="http://schemas.microsoft.com/office/drawing/2010/main" w="9525">
                   <a:solidFill>
                     <a:srgbClr val="000000"/>
                   </a:solidFill>
@@ -11648,7 +11648,7 @@
             </a:ln>
             <a:extLst>
               <a:ext uri="{91240B29-F687-4f45-9708-019B960494DF}">
-                <a14:hiddenLine xmlns:a14="http://schemas.microsoft.com/office/drawing/2010/main" xmlns="" w="9525">
+                <a14:hiddenLine xmlns="" xmlns:a14="http://schemas.microsoft.com/office/drawing/2010/main" w="9525">
                   <a:solidFill>
                     <a:srgbClr val="000000"/>
                   </a:solidFill>
@@ -11682,7 +11682,7 @@
             </a:ln>
             <a:extLst>
               <a:ext uri="{91240B29-F687-4f45-9708-019B960494DF}">
-                <a14:hiddenLine xmlns:a14="http://schemas.microsoft.com/office/drawing/2010/main" xmlns="" w="9525">
+                <a14:hiddenLine xmlns="" xmlns:a14="http://schemas.microsoft.com/office/drawing/2010/main" w="9525">
                   <a:solidFill>
                     <a:srgbClr val="000000"/>
                   </a:solidFill>
@@ -11772,7 +11772,7 @@
             </a:ln>
             <a:extLst>
               <a:ext uri="{91240B29-F687-4f45-9708-019B960494DF}">
-                <a14:hiddenLine xmlns:a14="http://schemas.microsoft.com/office/drawing/2010/main" xmlns="" w="9525">
+                <a14:hiddenLine xmlns="" xmlns:a14="http://schemas.microsoft.com/office/drawing/2010/main" w="9525">
                   <a:solidFill>
                     <a:srgbClr val="000000"/>
                   </a:solidFill>
@@ -11834,7 +11834,7 @@
             </a:ln>
             <a:extLst>
               <a:ext uri="{91240B29-F687-4f45-9708-019B960494DF}">
-                <a14:hiddenLine xmlns:a14="http://schemas.microsoft.com/office/drawing/2010/main" xmlns="" w="9525">
+                <a14:hiddenLine xmlns="" xmlns:a14="http://schemas.microsoft.com/office/drawing/2010/main" w="9525">
                   <a:solidFill>
                     <a:srgbClr val="000000"/>
                   </a:solidFill>
@@ -11896,7 +11896,7 @@
             </a:ln>
             <a:extLst>
               <a:ext uri="{91240B29-F687-4f45-9708-019B960494DF}">
-                <a14:hiddenLine xmlns:a14="http://schemas.microsoft.com/office/drawing/2010/main" xmlns="" w="9525">
+                <a14:hiddenLine xmlns="" xmlns:a14="http://schemas.microsoft.com/office/drawing/2010/main" w="9525">
                   <a:solidFill>
                     <a:srgbClr val="000000"/>
                   </a:solidFill>
@@ -11986,7 +11986,7 @@
             </a:ln>
             <a:extLst>
               <a:ext uri="{91240B29-F687-4f45-9708-019B960494DF}">
-                <a14:hiddenLine xmlns:a14="http://schemas.microsoft.com/office/drawing/2010/main" xmlns="" w="9525">
+                <a14:hiddenLine xmlns="" xmlns:a14="http://schemas.microsoft.com/office/drawing/2010/main" w="9525">
                   <a:solidFill>
                     <a:srgbClr val="000000"/>
                   </a:solidFill>
@@ -12048,7 +12048,7 @@
             </a:ln>
             <a:extLst>
               <a:ext uri="{91240B29-F687-4f45-9708-019B960494DF}">
-                <a14:hiddenLine xmlns:a14="http://schemas.microsoft.com/office/drawing/2010/main" xmlns="" w="9525">
+                <a14:hiddenLine xmlns="" xmlns:a14="http://schemas.microsoft.com/office/drawing/2010/main" w="9525">
                   <a:solidFill>
                     <a:srgbClr val="000000"/>
                   </a:solidFill>
@@ -12110,7 +12110,7 @@
             </a:ln>
             <a:extLst>
               <a:ext uri="{91240B29-F687-4f45-9708-019B960494DF}">
-                <a14:hiddenLine xmlns:a14="http://schemas.microsoft.com/office/drawing/2010/main" xmlns="" w="9525">
+                <a14:hiddenLine xmlns="" xmlns:a14="http://schemas.microsoft.com/office/drawing/2010/main" w="9525">
                   <a:solidFill>
                     <a:srgbClr val="000000"/>
                   </a:solidFill>
@@ -12200,7 +12200,7 @@
             </a:ln>
             <a:extLst>
               <a:ext uri="{91240B29-F687-4f45-9708-019B960494DF}">
-                <a14:hiddenLine xmlns:a14="http://schemas.microsoft.com/office/drawing/2010/main" xmlns="" w="9525">
+                <a14:hiddenLine xmlns="" xmlns:a14="http://schemas.microsoft.com/office/drawing/2010/main" w="9525">
                   <a:solidFill>
                     <a:srgbClr val="000000"/>
                   </a:solidFill>
@@ -12290,7 +12290,7 @@
             </a:ln>
             <a:extLst>
               <a:ext uri="{91240B29-F687-4f45-9708-019B960494DF}">
-                <a14:hiddenLine xmlns:a14="http://schemas.microsoft.com/office/drawing/2010/main" xmlns="" w="9525">
+                <a14:hiddenLine xmlns="" xmlns:a14="http://schemas.microsoft.com/office/drawing/2010/main" w="9525">
                   <a:solidFill>
                     <a:srgbClr val="000000"/>
                   </a:solidFill>
@@ -12352,7 +12352,7 @@
             </a:ln>
             <a:extLst>
               <a:ext uri="{91240B29-F687-4f45-9708-019B960494DF}">
-                <a14:hiddenLine xmlns:a14="http://schemas.microsoft.com/office/drawing/2010/main" xmlns="" w="9525">
+                <a14:hiddenLine xmlns="" xmlns:a14="http://schemas.microsoft.com/office/drawing/2010/main" w="9525">
                   <a:solidFill>
                     <a:srgbClr val="000000"/>
                   </a:solidFill>
@@ -12462,7 +12462,7 @@
             </a:ln>
             <a:extLst>
               <a:ext uri="{91240B29-F687-4f45-9708-019B960494DF}">
-                <a14:hiddenLine xmlns:a14="http://schemas.microsoft.com/office/drawing/2010/main" xmlns="" w="9525">
+                <a14:hiddenLine xmlns="" xmlns:a14="http://schemas.microsoft.com/office/drawing/2010/main" w="9525">
                   <a:solidFill>
                     <a:srgbClr val="000000"/>
                   </a:solidFill>
@@ -12524,7 +12524,7 @@
             </a:ln>
             <a:extLst>
               <a:ext uri="{91240B29-F687-4f45-9708-019B960494DF}">
-                <a14:hiddenLine xmlns:a14="http://schemas.microsoft.com/office/drawing/2010/main" xmlns="" w="9525">
+                <a14:hiddenLine xmlns="" xmlns:a14="http://schemas.microsoft.com/office/drawing/2010/main" w="9525">
                   <a:solidFill>
                     <a:srgbClr val="000000"/>
                   </a:solidFill>
@@ -12614,7 +12614,7 @@
             </a:ln>
             <a:extLst>
               <a:ext uri="{91240B29-F687-4f45-9708-019B960494DF}">
-                <a14:hiddenLine xmlns:a14="http://schemas.microsoft.com/office/drawing/2010/main" xmlns="" w="9525">
+                <a14:hiddenLine xmlns="" xmlns:a14="http://schemas.microsoft.com/office/drawing/2010/main" w="9525">
                   <a:solidFill>
                     <a:srgbClr val="000000"/>
                   </a:solidFill>
@@ -12704,7 +12704,7 @@
             </a:ln>
             <a:extLst>
               <a:ext uri="{91240B29-F687-4f45-9708-019B960494DF}">
-                <a14:hiddenLine xmlns:a14="http://schemas.microsoft.com/office/drawing/2010/main" xmlns="" w="9525">
+                <a14:hiddenLine xmlns="" xmlns:a14="http://schemas.microsoft.com/office/drawing/2010/main" w="9525">
                   <a:solidFill>
                     <a:srgbClr val="000000"/>
                   </a:solidFill>
@@ -12766,7 +12766,7 @@
             </a:ln>
             <a:extLst>
               <a:ext uri="{91240B29-F687-4f45-9708-019B960494DF}">
-                <a14:hiddenLine xmlns:a14="http://schemas.microsoft.com/office/drawing/2010/main" xmlns="" w="9525">
+                <a14:hiddenLine xmlns="" xmlns:a14="http://schemas.microsoft.com/office/drawing/2010/main" w="9525">
                   <a:solidFill>
                     <a:srgbClr val="000000"/>
                   </a:solidFill>
@@ -12856,7 +12856,7 @@
             </a:ln>
             <a:extLst>
               <a:ext uri="{91240B29-F687-4f45-9708-019B960494DF}">
-                <a14:hiddenLine xmlns:a14="http://schemas.microsoft.com/office/drawing/2010/main" xmlns="" w="9525">
+                <a14:hiddenLine xmlns="" xmlns:a14="http://schemas.microsoft.com/office/drawing/2010/main" w="9525">
                   <a:solidFill>
                     <a:srgbClr val="000000"/>
                   </a:solidFill>
@@ -12946,7 +12946,7 @@
             </a:ln>
             <a:extLst>
               <a:ext uri="{91240B29-F687-4f45-9708-019B960494DF}">
-                <a14:hiddenLine xmlns:a14="http://schemas.microsoft.com/office/drawing/2010/main" xmlns="" w="9525">
+                <a14:hiddenLine xmlns="" xmlns:a14="http://schemas.microsoft.com/office/drawing/2010/main" w="9525">
                   <a:solidFill>
                     <a:srgbClr val="000000"/>
                   </a:solidFill>
@@ -13002,7 +13002,7 @@
             </a:ln>
             <a:extLst>
               <a:ext uri="{91240B29-F687-4f45-9708-019B960494DF}">
-                <a14:hiddenLine xmlns:a14="http://schemas.microsoft.com/office/drawing/2010/main" xmlns="" w="9525">
+                <a14:hiddenLine xmlns="" xmlns:a14="http://schemas.microsoft.com/office/drawing/2010/main" w="9525">
                   <a:solidFill>
                     <a:srgbClr val="000000"/>
                   </a:solidFill>
@@ -13092,7 +13092,7 @@
             </a:ln>
             <a:extLst>
               <a:ext uri="{91240B29-F687-4f45-9708-019B960494DF}">
-                <a14:hiddenLine xmlns:a14="http://schemas.microsoft.com/office/drawing/2010/main" xmlns="" w="9525">
+                <a14:hiddenLine xmlns="" xmlns:a14="http://schemas.microsoft.com/office/drawing/2010/main" w="9525">
                   <a:solidFill>
                     <a:srgbClr val="000000"/>
                   </a:solidFill>
@@ -13148,7 +13148,7 @@
             </a:ln>
             <a:extLst>
               <a:ext uri="{91240B29-F687-4f45-9708-019B960494DF}">
-                <a14:hiddenLine xmlns:a14="http://schemas.microsoft.com/office/drawing/2010/main" xmlns="" w="9525">
+                <a14:hiddenLine xmlns="" xmlns:a14="http://schemas.microsoft.com/office/drawing/2010/main" w="9525">
                   <a:solidFill>
                     <a:srgbClr val="000000"/>
                   </a:solidFill>
@@ -13238,7 +13238,7 @@
             </a:ln>
             <a:extLst>
               <a:ext uri="{91240B29-F687-4f45-9708-019B960494DF}">
-                <a14:hiddenLine xmlns:a14="http://schemas.microsoft.com/office/drawing/2010/main" xmlns="" w="9525">
+                <a14:hiddenLine xmlns="" xmlns:a14="http://schemas.microsoft.com/office/drawing/2010/main" w="9525">
                   <a:solidFill>
                     <a:srgbClr val="000000"/>
                   </a:solidFill>
@@ -13306,7 +13306,7 @@
             </a:ln>
             <a:extLst>
               <a:ext uri="{91240B29-F687-4f45-9708-019B960494DF}">
-                <a14:hiddenLine xmlns:a14="http://schemas.microsoft.com/office/drawing/2010/main" xmlns="" w="9525">
+                <a14:hiddenLine xmlns="" xmlns:a14="http://schemas.microsoft.com/office/drawing/2010/main" w="9525">
                   <a:solidFill>
                     <a:srgbClr val="000000"/>
                   </a:solidFill>
@@ -13396,7 +13396,7 @@
             </a:ln>
             <a:extLst>
               <a:ext uri="{91240B29-F687-4f45-9708-019B960494DF}">
-                <a14:hiddenLine xmlns:a14="http://schemas.microsoft.com/office/drawing/2010/main" xmlns="" w="9525">
+                <a14:hiddenLine xmlns="" xmlns:a14="http://schemas.microsoft.com/office/drawing/2010/main" w="9525">
                   <a:solidFill>
                     <a:srgbClr val="000000"/>
                   </a:solidFill>
@@ -13464,7 +13464,7 @@
             </a:ln>
             <a:extLst>
               <a:ext uri="{91240B29-F687-4f45-9708-019B960494DF}">
-                <a14:hiddenLine xmlns:a14="http://schemas.microsoft.com/office/drawing/2010/main" xmlns="" w="9525">
+                <a14:hiddenLine xmlns="" xmlns:a14="http://schemas.microsoft.com/office/drawing/2010/main" w="9525">
                   <a:solidFill>
                     <a:srgbClr val="000000"/>
                   </a:solidFill>
@@ -13554,7 +13554,7 @@
             </a:ln>
             <a:extLst>
               <a:ext uri="{91240B29-F687-4f45-9708-019B960494DF}">
-                <a14:hiddenLine xmlns:a14="http://schemas.microsoft.com/office/drawing/2010/main" xmlns="" w="9525">
+                <a14:hiddenLine xmlns="" xmlns:a14="http://schemas.microsoft.com/office/drawing/2010/main" w="9525">
                   <a:solidFill>
                     <a:srgbClr val="000000"/>
                   </a:solidFill>
@@ -13588,7 +13588,7 @@
             </a:ln>
             <a:extLst>
               <a:ext uri="{91240B29-F687-4f45-9708-019B960494DF}">
-                <a14:hiddenLine xmlns:a14="http://schemas.microsoft.com/office/drawing/2010/main" xmlns="" w="9525">
+                <a14:hiddenLine xmlns="" xmlns:a14="http://schemas.microsoft.com/office/drawing/2010/main" w="9525">
                   <a:solidFill>
                     <a:srgbClr val="000000"/>
                   </a:solidFill>
@@ -13678,7 +13678,7 @@
             </a:ln>
             <a:extLst>
               <a:ext uri="{91240B29-F687-4f45-9708-019B960494DF}">
-                <a14:hiddenLine xmlns:a14="http://schemas.microsoft.com/office/drawing/2010/main" xmlns="" w="9525">
+                <a14:hiddenLine xmlns="" xmlns:a14="http://schemas.microsoft.com/office/drawing/2010/main" w="9525">
                   <a:solidFill>
                     <a:srgbClr val="000000"/>
                   </a:solidFill>
@@ -13740,7 +13740,7 @@
             </a:ln>
             <a:extLst>
               <a:ext uri="{91240B29-F687-4f45-9708-019B960494DF}">
-                <a14:hiddenLine xmlns:a14="http://schemas.microsoft.com/office/drawing/2010/main" xmlns="" w="9525">
+                <a14:hiddenLine xmlns="" xmlns:a14="http://schemas.microsoft.com/office/drawing/2010/main" w="9525">
                   <a:solidFill>
                     <a:srgbClr val="000000"/>
                   </a:solidFill>
@@ -13802,7 +13802,7 @@
             </a:ln>
             <a:extLst>
               <a:ext uri="{91240B29-F687-4f45-9708-019B960494DF}">
-                <a14:hiddenLine xmlns:a14="http://schemas.microsoft.com/office/drawing/2010/main" xmlns="" w="9525">
+                <a14:hiddenLine xmlns="" xmlns:a14="http://schemas.microsoft.com/office/drawing/2010/main" w="9525">
                   <a:solidFill>
                     <a:srgbClr val="000000"/>
                   </a:solidFill>
@@ -13892,7 +13892,7 @@
             </a:ln>
             <a:extLst>
               <a:ext uri="{91240B29-F687-4f45-9708-019B960494DF}">
-                <a14:hiddenLine xmlns:a14="http://schemas.microsoft.com/office/drawing/2010/main" xmlns="" w="9525">
+                <a14:hiddenLine xmlns="" xmlns:a14="http://schemas.microsoft.com/office/drawing/2010/main" w="9525">
                   <a:solidFill>
                     <a:srgbClr val="000000"/>
                   </a:solidFill>
@@ -13960,7 +13960,7 @@
             </a:ln>
             <a:extLst>
               <a:ext uri="{91240B29-F687-4f45-9708-019B960494DF}">
-                <a14:hiddenLine xmlns:a14="http://schemas.microsoft.com/office/drawing/2010/main" xmlns="" w="9525">
+                <a14:hiddenLine xmlns="" xmlns:a14="http://schemas.microsoft.com/office/drawing/2010/main" w="9525">
                   <a:solidFill>
                     <a:srgbClr val="000000"/>
                   </a:solidFill>
@@ -14022,7 +14022,7 @@
             </a:ln>
             <a:extLst>
               <a:ext uri="{91240B29-F687-4f45-9708-019B960494DF}">
-                <a14:hiddenLine xmlns:a14="http://schemas.microsoft.com/office/drawing/2010/main" xmlns="" w="9525">
+                <a14:hiddenLine xmlns="" xmlns:a14="http://schemas.microsoft.com/office/drawing/2010/main" w="9525">
                   <a:solidFill>
                     <a:srgbClr val="000000"/>
                   </a:solidFill>
@@ -14112,7 +14112,7 @@
             </a:ln>
             <a:extLst>
               <a:ext uri="{91240B29-F687-4f45-9708-019B960494DF}">
-                <a14:hiddenLine xmlns:a14="http://schemas.microsoft.com/office/drawing/2010/main" xmlns="" w="9525">
+                <a14:hiddenLine xmlns="" xmlns:a14="http://schemas.microsoft.com/office/drawing/2010/main" w="9525">
                   <a:solidFill>
                     <a:srgbClr val="000000"/>
                   </a:solidFill>
@@ -14174,7 +14174,7 @@
             </a:ln>
             <a:extLst>
               <a:ext uri="{91240B29-F687-4f45-9708-019B960494DF}">
-                <a14:hiddenLine xmlns:a14="http://schemas.microsoft.com/office/drawing/2010/main" xmlns="" w="9525">
+                <a14:hiddenLine xmlns="" xmlns:a14="http://schemas.microsoft.com/office/drawing/2010/main" w="9525">
                   <a:solidFill>
                     <a:srgbClr val="000000"/>
                   </a:solidFill>
@@ -14264,7 +14264,7 @@
             </a:ln>
             <a:extLst>
               <a:ext uri="{91240B29-F687-4f45-9708-019B960494DF}">
-                <a14:hiddenLine xmlns:a14="http://schemas.microsoft.com/office/drawing/2010/main" xmlns="" w="9525">
+                <a14:hiddenLine xmlns="" xmlns:a14="http://schemas.microsoft.com/office/drawing/2010/main" w="9525">
                   <a:solidFill>
                     <a:srgbClr val="000000"/>
                   </a:solidFill>
@@ -14326,7 +14326,7 @@
             </a:ln>
             <a:extLst>
               <a:ext uri="{91240B29-F687-4f45-9708-019B960494DF}">
-                <a14:hiddenLine xmlns:a14="http://schemas.microsoft.com/office/drawing/2010/main" xmlns="" w="9525">
+                <a14:hiddenLine xmlns="" xmlns:a14="http://schemas.microsoft.com/office/drawing/2010/main" w="9525">
                   <a:solidFill>
                     <a:srgbClr val="000000"/>
                   </a:solidFill>
@@ -14416,7 +14416,7 @@
             </a:ln>
             <a:extLst>
               <a:ext uri="{91240B29-F687-4f45-9708-019B960494DF}">
-                <a14:hiddenLine xmlns:a14="http://schemas.microsoft.com/office/drawing/2010/main" xmlns="" w="9525">
+                <a14:hiddenLine xmlns="" xmlns:a14="http://schemas.microsoft.com/office/drawing/2010/main" w="9525">
                   <a:solidFill>
                     <a:srgbClr val="000000"/>
                   </a:solidFill>
@@ -14450,7 +14450,7 @@
             </a:ln>
             <a:extLst>
               <a:ext uri="{91240B29-F687-4f45-9708-019B960494DF}">
-                <a14:hiddenLine xmlns:a14="http://schemas.microsoft.com/office/drawing/2010/main" xmlns="" w="9525">
+                <a14:hiddenLine xmlns="" xmlns:a14="http://schemas.microsoft.com/office/drawing/2010/main" w="9525">
                   <a:solidFill>
                     <a:srgbClr val="000000"/>
                   </a:solidFill>
@@ -14515,7 +14515,7 @@
             </a:ln>
             <a:extLst>
               <a:ext uri="{91240B29-F687-4f45-9708-019B960494DF}">
-                <a14:hiddenLine xmlns:a14="http://schemas.microsoft.com/office/drawing/2010/main" xmlns="" w="9525">
+                <a14:hiddenLine xmlns="" xmlns:a14="http://schemas.microsoft.com/office/drawing/2010/main" w="9525">
                   <a:solidFill>
                     <a:srgbClr val="000000"/>
                   </a:solidFill>
@@ -14605,7 +14605,7 @@
             </a:ln>
             <a:extLst>
               <a:ext uri="{91240B29-F687-4f45-9708-019B960494DF}">
-                <a14:hiddenLine xmlns:a14="http://schemas.microsoft.com/office/drawing/2010/main" xmlns="" w="9525">
+                <a14:hiddenLine xmlns="" xmlns:a14="http://schemas.microsoft.com/office/drawing/2010/main" w="9525">
                   <a:solidFill>
                     <a:srgbClr val="000000"/>
                   </a:solidFill>
@@ -14667,7 +14667,7 @@
             </a:ln>
             <a:extLst>
               <a:ext uri="{91240B29-F687-4f45-9708-019B960494DF}">
-                <a14:hiddenLine xmlns:a14="http://schemas.microsoft.com/office/drawing/2010/main" xmlns="" w="9525">
+                <a14:hiddenLine xmlns="" xmlns:a14="http://schemas.microsoft.com/office/drawing/2010/main" w="9525">
                   <a:solidFill>
                     <a:srgbClr val="000000"/>
                   </a:solidFill>
@@ -14757,7 +14757,7 @@
             </a:ln>
             <a:extLst>
               <a:ext uri="{91240B29-F687-4f45-9708-019B960494DF}">
-                <a14:hiddenLine xmlns:a14="http://schemas.microsoft.com/office/drawing/2010/main" xmlns="" w="9525">
+                <a14:hiddenLine xmlns="" xmlns:a14="http://schemas.microsoft.com/office/drawing/2010/main" w="9525">
                   <a:solidFill>
                     <a:srgbClr val="000000"/>
                   </a:solidFill>
@@ -14847,7 +14847,7 @@
             </a:ln>
             <a:extLst>
               <a:ext uri="{91240B29-F687-4f45-9708-019B960494DF}">
-                <a14:hiddenLine xmlns:a14="http://schemas.microsoft.com/office/drawing/2010/main" xmlns="" w="9525">
+                <a14:hiddenLine xmlns="" xmlns:a14="http://schemas.microsoft.com/office/drawing/2010/main" w="9525">
                   <a:solidFill>
                     <a:srgbClr val="000000"/>
                   </a:solidFill>
@@ -14912,7 +14912,7 @@
             </a:ln>
             <a:extLst>
               <a:ext uri="{91240B29-F687-4f45-9708-019B960494DF}">
-                <a14:hiddenLine xmlns:a14="http://schemas.microsoft.com/office/drawing/2010/main" xmlns="" w="9525">
+                <a14:hiddenLine xmlns="" xmlns:a14="http://schemas.microsoft.com/office/drawing/2010/main" w="9525">
                   <a:solidFill>
                     <a:srgbClr val="000000"/>
                   </a:solidFill>
@@ -14974,7 +14974,7 @@
             </a:ln>
             <a:extLst>
               <a:ext uri="{91240B29-F687-4f45-9708-019B960494DF}">
-                <a14:hiddenLine xmlns:a14="http://schemas.microsoft.com/office/drawing/2010/main" xmlns="" w="9525">
+                <a14:hiddenLine xmlns="" xmlns:a14="http://schemas.microsoft.com/office/drawing/2010/main" w="9525">
                   <a:solidFill>
                     <a:srgbClr val="000000"/>
                   </a:solidFill>
@@ -15064,7 +15064,7 @@
             </a:ln>
             <a:extLst>
               <a:ext uri="{91240B29-F687-4f45-9708-019B960494DF}">
-                <a14:hiddenLine xmlns:a14="http://schemas.microsoft.com/office/drawing/2010/main" xmlns="" w="9525">
+                <a14:hiddenLine xmlns="" xmlns:a14="http://schemas.microsoft.com/office/drawing/2010/main" w="9525">
                   <a:solidFill>
                     <a:srgbClr val="000000"/>
                   </a:solidFill>
@@ -15154,7 +15154,7 @@
             </a:ln>
             <a:extLst>
               <a:ext uri="{91240B29-F687-4f45-9708-019B960494DF}">
-                <a14:hiddenLine xmlns:a14="http://schemas.microsoft.com/office/drawing/2010/main" xmlns="" w="9525">
+                <a14:hiddenLine xmlns="" xmlns:a14="http://schemas.microsoft.com/office/drawing/2010/main" w="9525">
                   <a:solidFill>
                     <a:srgbClr val="000000"/>
                   </a:solidFill>
@@ -15216,7 +15216,7 @@
             </a:ln>
             <a:extLst>
               <a:ext uri="{91240B29-F687-4f45-9708-019B960494DF}">
-                <a14:hiddenLine xmlns:a14="http://schemas.microsoft.com/office/drawing/2010/main" xmlns="" w="9525">
+                <a14:hiddenLine xmlns="" xmlns:a14="http://schemas.microsoft.com/office/drawing/2010/main" w="9525">
                   <a:solidFill>
                     <a:srgbClr val="000000"/>
                   </a:solidFill>
@@ -15336,7 +15336,7 @@
             </a:ln>
             <a:extLst>
               <a:ext uri="{91240B29-F687-4f45-9708-019B960494DF}">
-                <a14:hiddenLine xmlns:a14="http://schemas.microsoft.com/office/drawing/2010/main" xmlns="" w="9525">
+                <a14:hiddenLine xmlns="" xmlns:a14="http://schemas.microsoft.com/office/drawing/2010/main" w="9525">
                   <a:solidFill>
                     <a:srgbClr val="000000"/>
                   </a:solidFill>
@@ -15404,7 +15404,7 @@
             </a:ln>
             <a:extLst>
               <a:ext uri="{91240B29-F687-4f45-9708-019B960494DF}">
-                <a14:hiddenLine xmlns:a14="http://schemas.microsoft.com/office/drawing/2010/main" xmlns="" w="9525">
+                <a14:hiddenLine xmlns="" xmlns:a14="http://schemas.microsoft.com/office/drawing/2010/main" w="9525">
                   <a:solidFill>
                     <a:srgbClr val="000000"/>
                   </a:solidFill>
@@ -15494,7 +15494,7 @@
             </a:ln>
             <a:extLst>
               <a:ext uri="{91240B29-F687-4f45-9708-019B960494DF}">
-                <a14:hiddenLine xmlns:a14="http://schemas.microsoft.com/office/drawing/2010/main" xmlns="" w="9525">
+                <a14:hiddenLine xmlns="" xmlns:a14="http://schemas.microsoft.com/office/drawing/2010/main" w="9525">
                   <a:solidFill>
                     <a:srgbClr val="000000"/>
                   </a:solidFill>
@@ -20223,7 +20223,7 @@
           <a:noFill/>
           <a:extLst>
             <a:ext uri="{909E8E84-426E-40dd-AFC4-6F175D3DCCD1}">
-              <a14:hiddenFill xmlns:a14="http://schemas.microsoft.com/office/drawing/2010/main" xmlns="">
+              <a14:hiddenFill xmlns="" xmlns:a14="http://schemas.microsoft.com/office/drawing/2010/main">
                 <a:solidFill>
                   <a:srgbClr val="FFFFFF"/>
                 </a:solidFill>
@@ -20297,7 +20297,7 @@
               </a:ln>
               <a:extLst>
                 <a:ext uri="{91240B29-F687-4f45-9708-019B960494DF}">
-                  <a14:hiddenLine xmlns:a14="http://schemas.microsoft.com/office/drawing/2010/main" xmlns="" w="9525">
+                  <a14:hiddenLine xmlns="" xmlns:a14="http://schemas.microsoft.com/office/drawing/2010/main" w="9525">
                     <a:solidFill>
                       <a:srgbClr val="000000"/>
                     </a:solidFill>
@@ -20387,7 +20387,7 @@
               </a:ln>
               <a:extLst>
                 <a:ext uri="{91240B29-F687-4f45-9708-019B960494DF}">
-                  <a14:hiddenLine xmlns:a14="http://schemas.microsoft.com/office/drawing/2010/main" xmlns="" w="9525">
+                  <a14:hiddenLine xmlns="" xmlns:a14="http://schemas.microsoft.com/office/drawing/2010/main" w="9525">
                     <a:solidFill>
                       <a:srgbClr val="000000"/>
                     </a:solidFill>
@@ -20477,7 +20477,7 @@
               </a:ln>
               <a:extLst>
                 <a:ext uri="{91240B29-F687-4f45-9708-019B960494DF}">
-                  <a14:hiddenLine xmlns:a14="http://schemas.microsoft.com/office/drawing/2010/main" xmlns="" w="9525">
+                  <a14:hiddenLine xmlns="" xmlns:a14="http://schemas.microsoft.com/office/drawing/2010/main" w="9525">
                     <a:solidFill>
                       <a:srgbClr val="000000"/>
                     </a:solidFill>
@@ -20539,7 +20539,7 @@
               </a:ln>
               <a:extLst>
                 <a:ext uri="{91240B29-F687-4f45-9708-019B960494DF}">
-                  <a14:hiddenLine xmlns:a14="http://schemas.microsoft.com/office/drawing/2010/main" xmlns="" w="9525">
+                  <a14:hiddenLine xmlns="" xmlns:a14="http://schemas.microsoft.com/office/drawing/2010/main" w="9525">
                     <a:solidFill>
                       <a:srgbClr val="000000"/>
                     </a:solidFill>
@@ -20629,7 +20629,7 @@
               </a:ln>
               <a:extLst>
                 <a:ext uri="{91240B29-F687-4f45-9708-019B960494DF}">
-                  <a14:hiddenLine xmlns:a14="http://schemas.microsoft.com/office/drawing/2010/main" xmlns="" w="9525">
+                  <a14:hiddenLine xmlns="" xmlns:a14="http://schemas.microsoft.com/office/drawing/2010/main" w="9525">
                     <a:solidFill>
                       <a:srgbClr val="000000"/>
                     </a:solidFill>
@@ -20691,7 +20691,7 @@
               </a:ln>
               <a:extLst>
                 <a:ext uri="{91240B29-F687-4f45-9708-019B960494DF}">
-                  <a14:hiddenLine xmlns:a14="http://schemas.microsoft.com/office/drawing/2010/main" xmlns="" w="9525">
+                  <a14:hiddenLine xmlns="" xmlns:a14="http://schemas.microsoft.com/office/drawing/2010/main" w="9525">
                     <a:solidFill>
                       <a:srgbClr val="000000"/>
                     </a:solidFill>
@@ -20753,7 +20753,7 @@
               </a:ln>
               <a:extLst>
                 <a:ext uri="{91240B29-F687-4f45-9708-019B960494DF}">
-                  <a14:hiddenLine xmlns:a14="http://schemas.microsoft.com/office/drawing/2010/main" xmlns="" w="9525">
+                  <a14:hiddenLine xmlns="" xmlns:a14="http://schemas.microsoft.com/office/drawing/2010/main" w="9525">
                     <a:solidFill>
                       <a:srgbClr val="000000"/>
                     </a:solidFill>
@@ -20843,7 +20843,7 @@
               </a:ln>
               <a:extLst>
                 <a:ext uri="{91240B29-F687-4f45-9708-019B960494DF}">
-                  <a14:hiddenLine xmlns:a14="http://schemas.microsoft.com/office/drawing/2010/main" xmlns="" w="9525">
+                  <a14:hiddenLine xmlns="" xmlns:a14="http://schemas.microsoft.com/office/drawing/2010/main" w="9525">
                     <a:solidFill>
                       <a:srgbClr val="000000"/>
                     </a:solidFill>
@@ -20933,7 +20933,7 @@
               </a:ln>
               <a:extLst>
                 <a:ext uri="{91240B29-F687-4f45-9708-019B960494DF}">
-                  <a14:hiddenLine xmlns:a14="http://schemas.microsoft.com/office/drawing/2010/main" xmlns="" w="9525">
+                  <a14:hiddenLine xmlns="" xmlns:a14="http://schemas.microsoft.com/office/drawing/2010/main" w="9525">
                     <a:solidFill>
                       <a:srgbClr val="000000"/>
                     </a:solidFill>
@@ -20995,7 +20995,7 @@
               </a:ln>
               <a:extLst>
                 <a:ext uri="{91240B29-F687-4f45-9708-019B960494DF}">
-                  <a14:hiddenLine xmlns:a14="http://schemas.microsoft.com/office/drawing/2010/main" xmlns="" w="9525">
+                  <a14:hiddenLine xmlns="" xmlns:a14="http://schemas.microsoft.com/office/drawing/2010/main" w="9525">
                     <a:solidFill>
                       <a:srgbClr val="000000"/>
                     </a:solidFill>
@@ -21105,7 +21105,7 @@
               </a:ln>
               <a:extLst>
                 <a:ext uri="{91240B29-F687-4f45-9708-019B960494DF}">
-                  <a14:hiddenLine xmlns:a14="http://schemas.microsoft.com/office/drawing/2010/main" xmlns="" w="9525">
+                  <a14:hiddenLine xmlns="" xmlns:a14="http://schemas.microsoft.com/office/drawing/2010/main" w="9525">
                     <a:solidFill>
                       <a:srgbClr val="000000"/>
                     </a:solidFill>
@@ -21189,7 +21189,7 @@
               </a:ln>
               <a:extLst>
                 <a:ext uri="{91240B29-F687-4f45-9708-019B960494DF}">
-                  <a14:hiddenLine xmlns:a14="http://schemas.microsoft.com/office/drawing/2010/main" xmlns="" w="9525">
+                  <a14:hiddenLine xmlns="" xmlns:a14="http://schemas.microsoft.com/office/drawing/2010/main" w="9525">
                     <a:solidFill>
                       <a:srgbClr val="000000"/>
                     </a:solidFill>
@@ -21251,7 +21251,7 @@
               </a:ln>
               <a:extLst>
                 <a:ext uri="{91240B29-F687-4f45-9708-019B960494DF}">
-                  <a14:hiddenLine xmlns:a14="http://schemas.microsoft.com/office/drawing/2010/main" xmlns="" w="9525">
+                  <a14:hiddenLine xmlns="" xmlns:a14="http://schemas.microsoft.com/office/drawing/2010/main" w="9525">
                     <a:solidFill>
                       <a:srgbClr val="000000"/>
                     </a:solidFill>
@@ -21313,7 +21313,7 @@
               </a:ln>
               <a:extLst>
                 <a:ext uri="{91240B29-F687-4f45-9708-019B960494DF}">
-                  <a14:hiddenLine xmlns:a14="http://schemas.microsoft.com/office/drawing/2010/main" xmlns="" w="9525">
+                  <a14:hiddenLine xmlns="" xmlns:a14="http://schemas.microsoft.com/office/drawing/2010/main" w="9525">
                     <a:solidFill>
                       <a:srgbClr val="000000"/>
                     </a:solidFill>
@@ -21403,7 +21403,7 @@
               </a:ln>
               <a:extLst>
                 <a:ext uri="{91240B29-F687-4f45-9708-019B960494DF}">
-                  <a14:hiddenLine xmlns:a14="http://schemas.microsoft.com/office/drawing/2010/main" xmlns="" w="9525">
+                  <a14:hiddenLine xmlns="" xmlns:a14="http://schemas.microsoft.com/office/drawing/2010/main" w="9525">
                     <a:solidFill>
                       <a:srgbClr val="000000"/>
                     </a:solidFill>
@@ -21437,7 +21437,7 @@
               </a:ln>
               <a:extLst>
                 <a:ext uri="{91240B29-F687-4f45-9708-019B960494DF}">
-                  <a14:hiddenLine xmlns:a14="http://schemas.microsoft.com/office/drawing/2010/main" xmlns="" w="9525">
+                  <a14:hiddenLine xmlns="" xmlns:a14="http://schemas.microsoft.com/office/drawing/2010/main" w="9525">
                     <a:solidFill>
                       <a:srgbClr val="000000"/>
                     </a:solidFill>
@@ -21502,7 +21502,7 @@
               </a:ln>
               <a:extLst>
                 <a:ext uri="{91240B29-F687-4f45-9708-019B960494DF}">
-                  <a14:hiddenLine xmlns:a14="http://schemas.microsoft.com/office/drawing/2010/main" xmlns="" w="9525">
+                  <a14:hiddenLine xmlns="" xmlns:a14="http://schemas.microsoft.com/office/drawing/2010/main" w="9525">
                     <a:solidFill>
                       <a:srgbClr val="000000"/>
                     </a:solidFill>
@@ -21592,7 +21592,7 @@
               </a:ln>
               <a:extLst>
                 <a:ext uri="{91240B29-F687-4f45-9708-019B960494DF}">
-                  <a14:hiddenLine xmlns:a14="http://schemas.microsoft.com/office/drawing/2010/main" xmlns="" w="9525">
+                  <a14:hiddenLine xmlns="" xmlns:a14="http://schemas.microsoft.com/office/drawing/2010/main" w="9525">
                     <a:solidFill>
                       <a:srgbClr val="000000"/>
                     </a:solidFill>
@@ -21654,7 +21654,7 @@
               </a:ln>
               <a:extLst>
                 <a:ext uri="{91240B29-F687-4f45-9708-019B960494DF}">
-                  <a14:hiddenLine xmlns:a14="http://schemas.microsoft.com/office/drawing/2010/main" xmlns="" w="9525">
+                  <a14:hiddenLine xmlns="" xmlns:a14="http://schemas.microsoft.com/office/drawing/2010/main" w="9525">
                     <a:solidFill>
                       <a:srgbClr val="000000"/>
                     </a:solidFill>
@@ -21744,7 +21744,7 @@
               </a:ln>
               <a:extLst>
                 <a:ext uri="{91240B29-F687-4f45-9708-019B960494DF}">
-                  <a14:hiddenLine xmlns:a14="http://schemas.microsoft.com/office/drawing/2010/main" xmlns="" w="9525">
+                  <a14:hiddenLine xmlns="" xmlns:a14="http://schemas.microsoft.com/office/drawing/2010/main" w="9525">
                     <a:solidFill>
                       <a:srgbClr val="000000"/>
                     </a:solidFill>
@@ -21809,7 +21809,7 @@
               </a:ln>
               <a:extLst>
                 <a:ext uri="{91240B29-F687-4f45-9708-019B960494DF}">
-                  <a14:hiddenLine xmlns:a14="http://schemas.microsoft.com/office/drawing/2010/main" xmlns="" w="9525">
+                  <a14:hiddenLine xmlns="" xmlns:a14="http://schemas.microsoft.com/office/drawing/2010/main" w="9525">
                     <a:solidFill>
                       <a:srgbClr val="000000"/>
                     </a:solidFill>
@@ -21871,7 +21871,7 @@
               </a:ln>
               <a:extLst>
                 <a:ext uri="{91240B29-F687-4f45-9708-019B960494DF}">
-                  <a14:hiddenLine xmlns:a14="http://schemas.microsoft.com/office/drawing/2010/main" xmlns="" w="9525">
+                  <a14:hiddenLine xmlns="" xmlns:a14="http://schemas.microsoft.com/office/drawing/2010/main" w="9525">
                     <a:solidFill>
                       <a:srgbClr val="000000"/>
                     </a:solidFill>
@@ -21961,7 +21961,7 @@
               </a:ln>
               <a:extLst>
                 <a:ext uri="{91240B29-F687-4f45-9708-019B960494DF}">
-                  <a14:hiddenLine xmlns:a14="http://schemas.microsoft.com/office/drawing/2010/main" xmlns="" w="9525">
+                  <a14:hiddenLine xmlns="" xmlns:a14="http://schemas.microsoft.com/office/drawing/2010/main" w="9525">
                     <a:solidFill>
                       <a:srgbClr val="000000"/>
                     </a:solidFill>
@@ -22051,7 +22051,7 @@
               </a:ln>
               <a:extLst>
                 <a:ext uri="{91240B29-F687-4f45-9708-019B960494DF}">
-                  <a14:hiddenLine xmlns:a14="http://schemas.microsoft.com/office/drawing/2010/main" xmlns="" w="9525">
+                  <a14:hiddenLine xmlns="" xmlns:a14="http://schemas.microsoft.com/office/drawing/2010/main" w="9525">
                     <a:solidFill>
                       <a:srgbClr val="000000"/>
                     </a:solidFill>
@@ -22116,7 +22116,7 @@
               </a:ln>
               <a:extLst>
                 <a:ext uri="{91240B29-F687-4f45-9708-019B960494DF}">
-                  <a14:hiddenLine xmlns:a14="http://schemas.microsoft.com/office/drawing/2010/main" xmlns="" w="9525">
+                  <a14:hiddenLine xmlns="" xmlns:a14="http://schemas.microsoft.com/office/drawing/2010/main" w="9525">
                     <a:solidFill>
                       <a:srgbClr val="000000"/>
                     </a:solidFill>
@@ -22236,7 +22236,7 @@
               </a:ln>
               <a:extLst>
                 <a:ext uri="{91240B29-F687-4f45-9708-019B960494DF}">
-                  <a14:hiddenLine xmlns:a14="http://schemas.microsoft.com/office/drawing/2010/main" xmlns="" w="9525">
+                  <a14:hiddenLine xmlns="" xmlns:a14="http://schemas.microsoft.com/office/drawing/2010/main" w="9525">
                     <a:solidFill>
                       <a:srgbClr val="000000"/>
                     </a:solidFill>
@@ -22334,7 +22334,7 @@
               </a:ln>
               <a:extLst>
                 <a:ext uri="{91240B29-F687-4f45-9708-019B960494DF}">
-                  <a14:hiddenLine xmlns:a14="http://schemas.microsoft.com/office/drawing/2010/main" xmlns="" w="9525">
+                  <a14:hiddenLine xmlns="" xmlns:a14="http://schemas.microsoft.com/office/drawing/2010/main" w="9525">
                     <a:solidFill>
                       <a:srgbClr val="000000"/>
                     </a:solidFill>
@@ -22449,7 +22449,7 @@
               </a:ln>
               <a:extLst>
                 <a:ext uri="{91240B29-F687-4f45-9708-019B960494DF}">
-                  <a14:hiddenLine xmlns:a14="http://schemas.microsoft.com/office/drawing/2010/main" xmlns="" w="9525">
+                  <a14:hiddenLine xmlns="" xmlns:a14="http://schemas.microsoft.com/office/drawing/2010/main" w="9525">
                     <a:solidFill>
                       <a:srgbClr val="000000"/>
                     </a:solidFill>
@@ -22539,7 +22539,7 @@
               </a:ln>
               <a:extLst>
                 <a:ext uri="{91240B29-F687-4f45-9708-019B960494DF}">
-                  <a14:hiddenLine xmlns:a14="http://schemas.microsoft.com/office/drawing/2010/main" xmlns="" w="9525">
+                  <a14:hiddenLine xmlns="" xmlns:a14="http://schemas.microsoft.com/office/drawing/2010/main" w="9525">
                     <a:solidFill>
                       <a:srgbClr val="000000"/>
                     </a:solidFill>
@@ -22604,7 +22604,7 @@
               </a:ln>
               <a:extLst>
                 <a:ext uri="{91240B29-F687-4f45-9708-019B960494DF}">
-                  <a14:hiddenLine xmlns:a14="http://schemas.microsoft.com/office/drawing/2010/main" xmlns="" w="9525">
+                  <a14:hiddenLine xmlns="" xmlns:a14="http://schemas.microsoft.com/office/drawing/2010/main" w="9525">
                     <a:solidFill>
                       <a:srgbClr val="000000"/>
                     </a:solidFill>
@@ -22694,7 +22694,7 @@
               </a:ln>
               <a:extLst>
                 <a:ext uri="{91240B29-F687-4f45-9708-019B960494DF}">
-                  <a14:hiddenLine xmlns:a14="http://schemas.microsoft.com/office/drawing/2010/main" xmlns="" w="9525">
+                  <a14:hiddenLine xmlns="" xmlns:a14="http://schemas.microsoft.com/office/drawing/2010/main" w="9525">
                     <a:solidFill>
                       <a:srgbClr val="000000"/>
                     </a:solidFill>
@@ -22762,7 +22762,7 @@
               </a:ln>
               <a:extLst>
                 <a:ext uri="{91240B29-F687-4f45-9708-019B960494DF}">
-                  <a14:hiddenLine xmlns:a14="http://schemas.microsoft.com/office/drawing/2010/main" xmlns="" w="9525">
+                  <a14:hiddenLine xmlns="" xmlns:a14="http://schemas.microsoft.com/office/drawing/2010/main" w="9525">
                     <a:solidFill>
                       <a:srgbClr val="000000"/>
                     </a:solidFill>
@@ -22852,7 +22852,7 @@
               </a:ln>
               <a:extLst>
                 <a:ext uri="{91240B29-F687-4f45-9708-019B960494DF}">
-                  <a14:hiddenLine xmlns:a14="http://schemas.microsoft.com/office/drawing/2010/main" xmlns="" w="9525">
+                  <a14:hiddenLine xmlns="" xmlns:a14="http://schemas.microsoft.com/office/drawing/2010/main" w="9525">
                     <a:solidFill>
                       <a:srgbClr val="000000"/>
                     </a:solidFill>
@@ -22920,7 +22920,7 @@
               </a:ln>
               <a:extLst>
                 <a:ext uri="{91240B29-F687-4f45-9708-019B960494DF}">
-                  <a14:hiddenLine xmlns:a14="http://schemas.microsoft.com/office/drawing/2010/main" xmlns="" w="9525">
+                  <a14:hiddenLine xmlns="" xmlns:a14="http://schemas.microsoft.com/office/drawing/2010/main" w="9525">
                     <a:solidFill>
                       <a:srgbClr val="000000"/>
                     </a:solidFill>
@@ -23010,7 +23010,7 @@
               </a:ln>
               <a:extLst>
                 <a:ext uri="{91240B29-F687-4f45-9708-019B960494DF}">
-                  <a14:hiddenLine xmlns:a14="http://schemas.microsoft.com/office/drawing/2010/main" xmlns="" w="9525">
+                  <a14:hiddenLine xmlns="" xmlns:a14="http://schemas.microsoft.com/office/drawing/2010/main" w="9525">
                     <a:solidFill>
                       <a:srgbClr val="000000"/>
                     </a:solidFill>
@@ -23044,7 +23044,7 @@
               </a:ln>
               <a:extLst>
                 <a:ext uri="{91240B29-F687-4f45-9708-019B960494DF}">
-                  <a14:hiddenLine xmlns:a14="http://schemas.microsoft.com/office/drawing/2010/main" xmlns="" w="9525">
+                  <a14:hiddenLine xmlns="" xmlns:a14="http://schemas.microsoft.com/office/drawing/2010/main" w="9525">
                     <a:solidFill>
                       <a:srgbClr val="000000"/>
                     </a:solidFill>
@@ -29310,8 +29310,8 @@
         </p:nvSpPr>
         <p:spPr>
           <a:xfrm>
-            <a:off x="857577" y="2400173"/>
-            <a:ext cx="10189835" cy="3973757"/>
+            <a:off x="857577" y="2898013"/>
+            <a:ext cx="10189835" cy="3147187"/>
           </a:xfrm>
         </p:spPr>
         <p:txBody>
@@ -29332,42 +29332,6 @@
                 </a:solidFill>
               </a:rPr>
               <a:t>Introduction</a:t>
-            </a:r>
-            <a:endParaRPr lang="it-IT" sz="2800" dirty="0">
-              <a:solidFill>
-                <a:sysClr val="windowText" lastClr="000000"/>
-              </a:solidFill>
-            </a:endParaRPr>
-          </a:p>
-          <a:p>
-            <a:pPr>
-              <a:lnSpc>
-                <a:spcPct val="150000"/>
-              </a:lnSpc>
-            </a:pPr>
-            <a:r>
-              <a:rPr lang="it-IT" sz="2800" dirty="0" err="1">
-                <a:solidFill>
-                  <a:sysClr val="windowText" lastClr="000000"/>
-                </a:solidFill>
-              </a:rPr>
-              <a:t>PyTorch</a:t>
-            </a:r>
-            <a:r>
-              <a:rPr lang="it-IT" sz="2800" dirty="0">
-                <a:solidFill>
-                  <a:sysClr val="windowText" lastClr="000000"/>
-                </a:solidFill>
-              </a:rPr>
-              <a:t> &amp; </a:t>
-            </a:r>
-            <a:r>
-              <a:rPr lang="it-IT" sz="2800" dirty="0" err="1">
-                <a:solidFill>
-                  <a:sysClr val="windowText" lastClr="000000"/>
-                </a:solidFill>
-              </a:rPr>
-              <a:t>OpenCV</a:t>
             </a:r>
             <a:endParaRPr lang="it-IT" sz="2800" dirty="0">
               <a:solidFill>
@@ -29972,112 +29936,6 @@
                                           <p:spTgt spid="3">
                                             <p:txEl>
                                               <p:pRg st="3" end="3"/>
-                                            </p:txEl>
-                                          </p:spTgt>
-                                        </p:tgtEl>
-                                        <p:attrNameLst>
-                                          <p:attrName>ppt_y</p:attrName>
-                                        </p:attrNameLst>
-                                      </p:cBhvr>
-                                      <p:tavLst>
-                                        <p:tav tm="0">
-                                          <p:val>
-                                            <p:strVal val="#ppt_y+.1"/>
-                                          </p:val>
-                                        </p:tav>
-                                        <p:tav tm="100000">
-                                          <p:val>
-                                            <p:strVal val="#ppt_y"/>
-                                          </p:val>
-                                        </p:tav>
-                                      </p:tavLst>
-                                    </p:anim>
-                                  </p:childTnLst>
-                                </p:cTn>
-                              </p:par>
-                            </p:childTnLst>
-                          </p:cTn>
-                        </p:par>
-                        <p:par>
-                          <p:cTn id="28" fill="hold">
-                            <p:stCondLst>
-                              <p:cond delay="2800"/>
-                            </p:stCondLst>
-                            <p:childTnLst>
-                              <p:par>
-                                <p:cTn id="29" presetID="42" presetClass="entr" presetSubtype="0" fill="hold" nodeType="afterEffect">
-                                  <p:stCondLst>
-                                    <p:cond delay="0"/>
-                                  </p:stCondLst>
-                                  <p:childTnLst>
-                                    <p:set>
-                                      <p:cBhvr>
-                                        <p:cTn id="30" dur="1" fill="hold">
-                                          <p:stCondLst>
-                                            <p:cond delay="0"/>
-                                          </p:stCondLst>
-                                        </p:cTn>
-                                        <p:tgtEl>
-                                          <p:spTgt spid="3">
-                                            <p:txEl>
-                                              <p:pRg st="4" end="4"/>
-                                            </p:txEl>
-                                          </p:spTgt>
-                                        </p:tgtEl>
-                                        <p:attrNameLst>
-                                          <p:attrName>style.visibility</p:attrName>
-                                        </p:attrNameLst>
-                                      </p:cBhvr>
-                                      <p:to>
-                                        <p:strVal val="visible"/>
-                                      </p:to>
-                                    </p:set>
-                                    <p:animEffect transition="in" filter="fade">
-                                      <p:cBhvr>
-                                        <p:cTn id="31" dur="700"/>
-                                        <p:tgtEl>
-                                          <p:spTgt spid="3">
-                                            <p:txEl>
-                                              <p:pRg st="4" end="4"/>
-                                            </p:txEl>
-                                          </p:spTgt>
-                                        </p:tgtEl>
-                                      </p:cBhvr>
-                                    </p:animEffect>
-                                    <p:anim calcmode="lin" valueType="num">
-                                      <p:cBhvr>
-                                        <p:cTn id="32" dur="700" fill="hold"/>
-                                        <p:tgtEl>
-                                          <p:spTgt spid="3">
-                                            <p:txEl>
-                                              <p:pRg st="4" end="4"/>
-                                            </p:txEl>
-                                          </p:spTgt>
-                                        </p:tgtEl>
-                                        <p:attrNameLst>
-                                          <p:attrName>ppt_x</p:attrName>
-                                        </p:attrNameLst>
-                                      </p:cBhvr>
-                                      <p:tavLst>
-                                        <p:tav tm="0">
-                                          <p:val>
-                                            <p:strVal val="#ppt_x"/>
-                                          </p:val>
-                                        </p:tav>
-                                        <p:tav tm="100000">
-                                          <p:val>
-                                            <p:strVal val="#ppt_x"/>
-                                          </p:val>
-                                        </p:tav>
-                                      </p:tavLst>
-                                    </p:anim>
-                                    <p:anim calcmode="lin" valueType="num">
-                                      <p:cBhvr>
-                                        <p:cTn id="33" dur="700" fill="hold"/>
-                                        <p:tgtEl>
-                                          <p:spTgt spid="3">
-                                            <p:txEl>
-                                              <p:pRg st="4" end="4"/>
                                             </p:txEl>
                                           </p:spTgt>
                                         </p:tgtEl>

</xml_diff>